<commit_message>
Some changes in following ppt slides
1)Design doc/Presentation.ppt
2)TDGame/document/Presentation.ppt
</commit_message>
<xml_diff>
--- a/Design Doc/Presentation.pptx
+++ b/Design Doc/Presentation.pptx
@@ -10,12 +10,12 @@
     <p:sldId id="258" r:id="rId4"/>
     <p:sldId id="259" r:id="rId5"/>
     <p:sldId id="260" r:id="rId6"/>
-    <p:sldId id="261" r:id="rId7"/>
-    <p:sldId id="262" r:id="rId8"/>
-    <p:sldId id="263" r:id="rId9"/>
-    <p:sldId id="264" r:id="rId10"/>
-    <p:sldId id="265" r:id="rId11"/>
-    <p:sldId id="266" r:id="rId12"/>
+    <p:sldId id="266" r:id="rId7"/>
+    <p:sldId id="261" r:id="rId8"/>
+    <p:sldId id="262" r:id="rId9"/>
+    <p:sldId id="263" r:id="rId10"/>
+    <p:sldId id="264" r:id="rId11"/>
+    <p:sldId id="265" r:id="rId12"/>
   </p:sldIdLst>
   <p:sldSz cx="12192000" cy="6858000"/>
   <p:notesSz cx="6858000" cy="9144000"/>
@@ -253,7 +253,7 @@
           <a:p>
             <a:fld id="{DF5C63CC-EC59-4D19-8326-B5CD44FF15C5}" type="datetimeFigureOut">
               <a:rPr lang="en-US" smtClean="0"/>
-              <a:t>2/16/2016</a:t>
+              <a:t>2/15/2016</a:t>
             </a:fld>
             <a:endParaRPr lang="en-US"/>
           </a:p>
@@ -423,7 +423,7 @@
           <a:p>
             <a:fld id="{DF5C63CC-EC59-4D19-8326-B5CD44FF15C5}" type="datetimeFigureOut">
               <a:rPr lang="en-US" smtClean="0"/>
-              <a:t>2/16/2016</a:t>
+              <a:t>2/15/2016</a:t>
             </a:fld>
             <a:endParaRPr lang="en-US"/>
           </a:p>
@@ -603,7 +603,7 @@
           <a:p>
             <a:fld id="{DF5C63CC-EC59-4D19-8326-B5CD44FF15C5}" type="datetimeFigureOut">
               <a:rPr lang="en-US" smtClean="0"/>
-              <a:t>2/16/2016</a:t>
+              <a:t>2/15/2016</a:t>
             </a:fld>
             <a:endParaRPr lang="en-US"/>
           </a:p>
@@ -773,7 +773,7 @@
           <a:p>
             <a:fld id="{DF5C63CC-EC59-4D19-8326-B5CD44FF15C5}" type="datetimeFigureOut">
               <a:rPr lang="en-US" smtClean="0"/>
-              <a:t>2/16/2016</a:t>
+              <a:t>2/15/2016</a:t>
             </a:fld>
             <a:endParaRPr lang="en-US"/>
           </a:p>
@@ -1019,7 +1019,7 @@
           <a:p>
             <a:fld id="{DF5C63CC-EC59-4D19-8326-B5CD44FF15C5}" type="datetimeFigureOut">
               <a:rPr lang="en-US" smtClean="0"/>
-              <a:t>2/16/2016</a:t>
+              <a:t>2/15/2016</a:t>
             </a:fld>
             <a:endParaRPr lang="en-US"/>
           </a:p>
@@ -1251,7 +1251,7 @@
           <a:p>
             <a:fld id="{DF5C63CC-EC59-4D19-8326-B5CD44FF15C5}" type="datetimeFigureOut">
               <a:rPr lang="en-US" smtClean="0"/>
-              <a:t>2/16/2016</a:t>
+              <a:t>2/15/2016</a:t>
             </a:fld>
             <a:endParaRPr lang="en-US"/>
           </a:p>
@@ -1618,7 +1618,7 @@
           <a:p>
             <a:fld id="{DF5C63CC-EC59-4D19-8326-B5CD44FF15C5}" type="datetimeFigureOut">
               <a:rPr lang="en-US" smtClean="0"/>
-              <a:t>2/16/2016</a:t>
+              <a:t>2/15/2016</a:t>
             </a:fld>
             <a:endParaRPr lang="en-US"/>
           </a:p>
@@ -1736,7 +1736,7 @@
           <a:p>
             <a:fld id="{DF5C63CC-EC59-4D19-8326-B5CD44FF15C5}" type="datetimeFigureOut">
               <a:rPr lang="en-US" smtClean="0"/>
-              <a:t>2/16/2016</a:t>
+              <a:t>2/15/2016</a:t>
             </a:fld>
             <a:endParaRPr lang="en-US"/>
           </a:p>
@@ -1831,7 +1831,7 @@
           <a:p>
             <a:fld id="{DF5C63CC-EC59-4D19-8326-B5CD44FF15C5}" type="datetimeFigureOut">
               <a:rPr lang="en-US" smtClean="0"/>
-              <a:t>2/16/2016</a:t>
+              <a:t>2/15/2016</a:t>
             </a:fld>
             <a:endParaRPr lang="en-US"/>
           </a:p>
@@ -2108,7 +2108,7 @@
           <a:p>
             <a:fld id="{DF5C63CC-EC59-4D19-8326-B5CD44FF15C5}" type="datetimeFigureOut">
               <a:rPr lang="en-US" smtClean="0"/>
-              <a:t>2/16/2016</a:t>
+              <a:t>2/15/2016</a:t>
             </a:fld>
             <a:endParaRPr lang="en-US"/>
           </a:p>
@@ -2361,7 +2361,7 @@
           <a:p>
             <a:fld id="{DF5C63CC-EC59-4D19-8326-B5CD44FF15C5}" type="datetimeFigureOut">
               <a:rPr lang="en-US" smtClean="0"/>
-              <a:t>2/16/2016</a:t>
+              <a:t>2/15/2016</a:t>
             </a:fld>
             <a:endParaRPr lang="en-US"/>
           </a:p>
@@ -2574,7 +2574,7 @@
           <a:p>
             <a:fld id="{DF5C63CC-EC59-4D19-8326-B5CD44FF15C5}" type="datetimeFigureOut">
               <a:rPr lang="en-US" smtClean="0"/>
-              <a:t>2/16/2016</a:t>
+              <a:t>2/15/2016</a:t>
             </a:fld>
             <a:endParaRPr lang="en-US"/>
           </a:p>
@@ -3452,50 +3452,54 @@
           <a:lstStyle/>
           <a:p>
             <a:r>
-              <a:rPr lang="en-CA" dirty="0"/>
-              <a:t>Testing</a:t>
-            </a:r>
-            <a:r>
-              <a:rPr lang="en-US" dirty="0"/>
-              <a:t/>
-            </a:r>
-            <a:br>
-              <a:rPr lang="en-US" dirty="0"/>
-            </a:br>
+              <a:rPr lang="en-CA" dirty="0" smtClean="0"/>
+              <a:t>UML Class diagram for MVC Architecture</a:t>
+            </a:r>
             <a:endParaRPr lang="en-US" dirty="0"/>
           </a:p>
         </p:txBody>
       </p:sp>
-      <p:sp>
-        <p:nvSpPr>
-          <p:cNvPr id="3" name="Content Placeholder 2"/>
-          <p:cNvSpPr>
-            <a:spLocks noGrp="1"/>
-          </p:cNvSpPr>
+      <p:pic>
+        <p:nvPicPr>
+          <p:cNvPr id="4" name="Content Placeholder 3" descr="Tower_UML"/>
+          <p:cNvPicPr>
+            <a:picLocks noGrp="1"/>
+          </p:cNvPicPr>
           <p:nvPr>
             <p:ph idx="1"/>
           </p:nvPr>
-        </p:nvSpPr>
-        <p:spPr/>
-        <p:txBody>
-          <a:bodyPr/>
-          <a:lstStyle/>
-          <a:p>
-            <a:r>
-              <a:rPr lang="en-CA" dirty="0"/>
-              <a:t>Unit testing applied to our system is the JUnit   Framework for the Java Programming Language. Since its time consuming to test all the methods in the system as the large number of methods in our system is large, only selected sets of methods were tested and the method chosen test the most important aspects of the code.</a:t>
-            </a:r>
-            <a:endParaRPr lang="en-US" dirty="0"/>
-          </a:p>
-          <a:p>
-            <a:endParaRPr lang="en-US" dirty="0"/>
-          </a:p>
-        </p:txBody>
-      </p:sp>
+        </p:nvPicPr>
+        <p:blipFill>
+          <a:blip r:embed="rId2">
+            <a:extLst>
+              <a:ext uri="{28A0092B-C50C-407E-A947-70E740481C1C}">
+                <a14:useLocalDpi xmlns:a14="http://schemas.microsoft.com/office/drawing/2010/main" val="0"/>
+              </a:ext>
+            </a:extLst>
+          </a:blip>
+          <a:srcRect/>
+          <a:stretch>
+            <a:fillRect/>
+          </a:stretch>
+        </p:blipFill>
+        <p:spPr bwMode="auto">
+          <a:xfrm>
+            <a:off x="3280428" y="2160603"/>
+            <a:ext cx="5631143" cy="4351338"/>
+          </a:xfrm>
+          <a:prstGeom prst="rect">
+            <a:avLst/>
+          </a:prstGeom>
+          <a:noFill/>
+          <a:ln>
+            <a:noFill/>
+          </a:ln>
+        </p:spPr>
+      </p:pic>
     </p:spTree>
     <p:extLst>
       <p:ext uri="{BB962C8B-B14F-4D97-AF65-F5344CB8AC3E}">
-        <p14:creationId xmlns:p14="http://schemas.microsoft.com/office/powerpoint/2010/main" val="1791428305"/>
+        <p14:creationId xmlns:p14="http://schemas.microsoft.com/office/powerpoint/2010/main" val="3077153077"/>
       </p:ext>
     </p:extLst>
   </p:cSld>
@@ -3545,9 +3549,16 @@
           <a:lstStyle/>
           <a:p>
             <a:r>
-              <a:rPr lang="en-US" dirty="0" smtClean="0"/>
-              <a:t>Agile Methodology</a:t>
-            </a:r>
+              <a:rPr lang="en-CA" dirty="0"/>
+              <a:t>Testing</a:t>
+            </a:r>
+            <a:r>
+              <a:rPr lang="en-US" dirty="0"/>
+              <a:t/>
+            </a:r>
+            <a:br>
+              <a:rPr lang="en-US" dirty="0"/>
+            </a:br>
             <a:endParaRPr lang="en-US" dirty="0"/>
           </a:p>
         </p:txBody>
@@ -3564,185 +3575,16 @@
         </p:nvSpPr>
         <p:spPr/>
         <p:txBody>
-          <a:bodyPr>
-            <a:normAutofit fontScale="55000" lnSpcReduction="20000"/>
-          </a:bodyPr>
-          <a:lstStyle/>
-          <a:p>
-            <a:r>
-              <a:rPr lang="en-US" dirty="0"/>
-              <a:t>Agile methodologies embrace iterations. </a:t>
-            </a:r>
-            <a:endParaRPr lang="en-US" dirty="0" smtClean="0"/>
-          </a:p>
-          <a:p>
-            <a:r>
-              <a:rPr lang="en-US" dirty="0" smtClean="0"/>
-              <a:t>Small </a:t>
-            </a:r>
-            <a:r>
-              <a:rPr lang="en-US" dirty="0"/>
-              <a:t>teams work together with </a:t>
-            </a:r>
-            <a:r>
-              <a:rPr lang="en-US" dirty="0" smtClean="0"/>
-              <a:t>stakeholders</a:t>
+          <a:bodyPr/>
+          <a:lstStyle/>
+          <a:p>
+            <a:r>
+              <a:rPr lang="en-CA" dirty="0"/>
+              <a:t>Unit testing applied to our system is the JUnit   Framework for the Java Programming Language. Since its time consuming to test all the methods in the system as the large number of methods in our system is large, only selected sets of methods were tested and the method chosen test the most important aspects of the code.</a:t>
             </a:r>
             <a:endParaRPr lang="en-US" dirty="0"/>
           </a:p>
           <a:p>
-            <a:r>
-              <a:rPr lang="en-US" dirty="0" smtClean="0"/>
-              <a:t>Proof </a:t>
-            </a:r>
-            <a:r>
-              <a:rPr lang="en-US" dirty="0"/>
-              <a:t>of concepts, or </a:t>
-            </a:r>
-            <a:r>
-              <a:rPr lang="en-US" dirty="0" smtClean="0"/>
-              <a:t>the </a:t>
-            </a:r>
-            <a:r>
-              <a:rPr lang="en-US" dirty="0"/>
-              <a:t>problem to be solved. </a:t>
-            </a:r>
-            <a:endParaRPr lang="en-US" dirty="0" smtClean="0"/>
-          </a:p>
-          <a:p>
-            <a:r>
-              <a:rPr lang="en-US" dirty="0" smtClean="0"/>
-              <a:t>The </a:t>
-            </a:r>
-            <a:r>
-              <a:rPr lang="en-US" dirty="0"/>
-              <a:t>team defines </a:t>
-            </a:r>
-            <a:r>
-              <a:rPr lang="en-US" dirty="0" smtClean="0"/>
-              <a:t>the requirements </a:t>
-            </a:r>
-            <a:r>
-              <a:rPr lang="en-US" dirty="0"/>
-              <a:t>for the iteration, develops the code, </a:t>
-            </a:r>
-            <a:r>
-              <a:rPr lang="en-US" dirty="0" smtClean="0"/>
-              <a:t>and </a:t>
-            </a:r>
-            <a:r>
-              <a:rPr lang="en-US" dirty="0"/>
-              <a:t>runs integrated test </a:t>
-            </a:r>
-            <a:r>
-              <a:rPr lang="en-US" dirty="0" smtClean="0"/>
-              <a:t>scripts.</a:t>
-            </a:r>
-          </a:p>
-          <a:p>
-            <a:r>
-              <a:rPr lang="en-US" dirty="0" smtClean="0"/>
-              <a:t>The users verify </a:t>
-            </a:r>
-            <a:r>
-              <a:rPr lang="en-US" dirty="0"/>
-              <a:t>the </a:t>
-            </a:r>
-            <a:r>
-              <a:rPr lang="en-US" dirty="0" smtClean="0"/>
-              <a:t>results.</a:t>
-            </a:r>
-          </a:p>
-          <a:p>
-            <a:r>
-              <a:rPr lang="en-US" dirty="0"/>
-              <a:t>Two agile software development methodologies</a:t>
-            </a:r>
-          </a:p>
-          <a:p>
-            <a:pPr marL="0" indent="0">
-              <a:buNone/>
-            </a:pPr>
-            <a:r>
-              <a:rPr lang="en-US" b="1" dirty="0" smtClean="0"/>
-              <a:t>1) XP</a:t>
-            </a:r>
-            <a:endParaRPr lang="en-US" b="1" dirty="0"/>
-          </a:p>
-          <a:p>
-            <a:r>
-              <a:rPr lang="en-US" dirty="0" smtClean="0"/>
-              <a:t>Extreme programming concentrates </a:t>
-            </a:r>
-            <a:r>
-              <a:rPr lang="en-US" dirty="0"/>
-              <a:t>on the development rather than managerial aspects of </a:t>
-            </a:r>
-            <a:r>
-              <a:rPr lang="en-US" dirty="0" smtClean="0"/>
-              <a:t>software project</a:t>
-            </a:r>
-          </a:p>
-          <a:p>
-            <a:r>
-              <a:rPr lang="en-US" dirty="0" smtClean="0"/>
-              <a:t>It start with a release planning phase, followed by several iterations.</a:t>
-            </a:r>
-          </a:p>
-          <a:p>
-            <a:r>
-              <a:rPr lang="en-US" dirty="0" smtClean="0"/>
-              <a:t>When </a:t>
-            </a:r>
-            <a:r>
-              <a:rPr lang="en-US" dirty="0"/>
-              <a:t>the product has enough features to satisfy users, the team terminates iteration</a:t>
-            </a:r>
-          </a:p>
-          <a:p>
-            <a:r>
-              <a:rPr lang="en-US" dirty="0"/>
-              <a:t>and releases the software</a:t>
-            </a:r>
-            <a:r>
-              <a:rPr lang="en-US" dirty="0" smtClean="0"/>
-              <a:t>.</a:t>
-            </a:r>
-          </a:p>
-          <a:p>
-            <a:pPr marL="0" indent="0">
-              <a:buNone/>
-            </a:pPr>
-            <a:r>
-              <a:rPr lang="en-US" sz="2700" b="1" dirty="0" smtClean="0"/>
-              <a:t>2) Scrum </a:t>
-            </a:r>
-            <a:r>
-              <a:rPr lang="en-US" sz="2700" b="1" dirty="0"/>
-              <a:t>development</a:t>
-            </a:r>
-          </a:p>
-          <a:p>
-            <a:r>
-              <a:rPr lang="en-US" dirty="0"/>
-              <a:t>The Scrum development process concentrates on managing sprints. Before each sprint begins, the </a:t>
-            </a:r>
-            <a:r>
-              <a:rPr lang="en-US" dirty="0" smtClean="0"/>
-              <a:t>team plans </a:t>
-            </a:r>
-            <a:r>
-              <a:rPr lang="en-US" dirty="0"/>
-              <a:t>the sprint, identifying the backlog items and assigning teams to these items. Teams develop, wrap</a:t>
-            </a:r>
-            <a:r>
-              <a:rPr lang="en-US" dirty="0" smtClean="0"/>
-              <a:t>, review</a:t>
-            </a:r>
-            <a:r>
-              <a:rPr lang="en-US" dirty="0"/>
-              <a:t>, and adjust each of the backlog items</a:t>
-            </a:r>
             <a:endParaRPr lang="en-US" dirty="0"/>
           </a:p>
         </p:txBody>
@@ -3750,13 +3592,20 @@
     </p:spTree>
     <p:extLst>
       <p:ext uri="{BB962C8B-B14F-4D97-AF65-F5344CB8AC3E}">
-        <p14:creationId xmlns:p14="http://schemas.microsoft.com/office/powerpoint/2010/main" val="4113563060"/>
+        <p14:creationId xmlns:p14="http://schemas.microsoft.com/office/powerpoint/2010/main" val="1791428305"/>
       </p:ext>
     </p:extLst>
   </p:cSld>
   <p:clrMapOvr>
     <a:masterClrMapping/>
   </p:clrMapOvr>
+  <p:timing>
+    <p:tnLst>
+      <p:par>
+        <p:cTn id="1" dur="indefinite" restart="never" nodeType="tmRoot"/>
+      </p:par>
+    </p:tnLst>
+  </p:timing>
 </p:sld>
 </file>
 
@@ -3787,39 +3636,51 @@
             <p:ph type="title"/>
           </p:nvPr>
         </p:nvSpPr>
-        <p:spPr/>
-        <p:txBody>
-          <a:bodyPr/>
-          <a:lstStyle/>
-          <a:p>
-            <a:pPr algn="ctr"/>
-            <a:r>
-              <a:rPr lang="en-US" b="1" dirty="0" smtClean="0"/>
-              <a:t>INTRODUCTION</a:t>
-            </a:r>
-            <a:endParaRPr lang="en-US" b="1" dirty="0"/>
-          </a:p>
-        </p:txBody>
-      </p:sp>
-      <p:sp>
-        <p:nvSpPr>
-          <p:cNvPr id="3" name="Content Placeholder 2"/>
-          <p:cNvSpPr>
-            <a:spLocks noGrp="1"/>
-          </p:cNvSpPr>
-          <p:nvPr>
-            <p:ph idx="1"/>
-          </p:nvPr>
-        </p:nvSpPr>
         <p:spPr>
           <a:xfrm>
-            <a:off x="838200" y="1448554"/>
-            <a:ext cx="10515600" cy="4728409"/>
+            <a:off x="838200" y="365126"/>
+            <a:ext cx="10515600" cy="1011002"/>
           </a:xfrm>
         </p:spPr>
         <p:txBody>
+          <a:bodyPr/>
+          <a:lstStyle/>
+          <a:p>
+            <a:r>
+              <a:rPr lang="en-US" sz="2800" b="1" dirty="0" smtClean="0">
+                <a:solidFill>
+                  <a:srgbClr val="FF0000"/>
+                </a:solidFill>
+              </a:rPr>
+              <a:t>INTRODUCTION</a:t>
+            </a:r>
+            <a:endParaRPr lang="en-US" b="1" dirty="0">
+              <a:solidFill>
+                <a:srgbClr val="FF0000"/>
+              </a:solidFill>
+            </a:endParaRPr>
+          </a:p>
+        </p:txBody>
+      </p:sp>
+      <p:sp>
+        <p:nvSpPr>
+          <p:cNvPr id="3" name="Content Placeholder 2"/>
+          <p:cNvSpPr>
+            <a:spLocks noGrp="1"/>
+          </p:cNvSpPr>
+          <p:nvPr>
+            <p:ph idx="1"/>
+          </p:nvPr>
+        </p:nvSpPr>
+        <p:spPr>
+          <a:xfrm>
+            <a:off x="838200" y="905348"/>
+            <a:ext cx="10515600" cy="5271616"/>
+          </a:xfrm>
+        </p:spPr>
+        <p:txBody>
           <a:bodyPr>
-            <a:normAutofit fontScale="92500" lnSpcReduction="10000"/>
+            <a:normAutofit fontScale="92500"/>
           </a:bodyPr>
           <a:lstStyle/>
           <a:p>
@@ -4001,15 +3862,19 @@
             </a:r>
             <a:r>
               <a:rPr lang="en-CA" dirty="0"/>
-              <a:t>functional requirements for deliverable </a:t>
+              <a:t>functional requirements for </a:t>
             </a:r>
             <a:r>
               <a:rPr lang="en-CA" dirty="0" smtClean="0"/>
-              <a:t>1st </a:t>
-            </a:r>
-            <a:r>
-              <a:rPr lang="en-CA" dirty="0"/>
-              <a:t>of the game include:</a:t>
+              <a:t>1</a:t>
+            </a:r>
+            <a:r>
+              <a:rPr lang="en-CA" baseline="30000" dirty="0" smtClean="0"/>
+              <a:t>st</a:t>
+            </a:r>
+            <a:r>
+              <a:rPr lang="en-CA" dirty="0" smtClean="0"/>
+              <a:t> deliverable includes:</a:t>
             </a:r>
             <a:endParaRPr lang="en-US" dirty="0"/>
           </a:p>
@@ -4162,105 +4027,79 @@
       </p:grpSpPr>
       <p:sp>
         <p:nvSpPr>
-          <p:cNvPr id="2" name="Title 1"/>
-          <p:cNvSpPr>
-            <a:spLocks noGrp="1"/>
-          </p:cNvSpPr>
-          <p:nvPr>
-            <p:ph type="title"/>
-          </p:nvPr>
-        </p:nvSpPr>
-        <p:spPr/>
-        <p:txBody>
-          <a:bodyPr/>
-          <a:lstStyle/>
-          <a:p>
-            <a:r>
-              <a:rPr lang="en-CA" b="1" dirty="0"/>
+          <p:cNvPr id="3" name="Content Placeholder 2"/>
+          <p:cNvSpPr>
+            <a:spLocks noGrp="1"/>
+          </p:cNvSpPr>
+          <p:nvPr>
+            <p:ph idx="1"/>
+          </p:nvPr>
+        </p:nvSpPr>
+        <p:spPr>
+          <a:xfrm>
+            <a:off x="838200" y="923453"/>
+            <a:ext cx="10515600" cy="5253510"/>
+          </a:xfrm>
+        </p:spPr>
+        <p:txBody>
+          <a:bodyPr>
+            <a:normAutofit fontScale="92500" lnSpcReduction="10000"/>
+          </a:bodyPr>
+          <a:lstStyle/>
+          <a:p>
+            <a:pPr marL="0" indent="0" algn="just">
+              <a:buNone/>
+            </a:pPr>
+            <a:r>
+              <a:rPr lang="en-CA" sz="3600" b="1" dirty="0">
+                <a:solidFill>
+                  <a:srgbClr val="FF0000"/>
+                </a:solidFill>
+              </a:rPr>
               <a:t>Architectural Design</a:t>
             </a:r>
-            <a:r>
-              <a:rPr lang="en-US" dirty="0"/>
-              <a:t/>
-            </a:r>
-            <a:br>
-              <a:rPr lang="en-US" dirty="0"/>
-            </a:br>
-            <a:endParaRPr lang="en-US" dirty="0"/>
-          </a:p>
-        </p:txBody>
-      </p:sp>
-      <p:sp>
-        <p:nvSpPr>
-          <p:cNvPr id="3" name="Content Placeholder 2"/>
-          <p:cNvSpPr>
-            <a:spLocks noGrp="1"/>
-          </p:cNvSpPr>
-          <p:nvPr>
-            <p:ph idx="1"/>
-          </p:nvPr>
-        </p:nvSpPr>
-        <p:spPr/>
-        <p:txBody>
-          <a:bodyPr>
-            <a:normAutofit fontScale="77500" lnSpcReduction="20000"/>
-          </a:bodyPr>
-          <a:lstStyle/>
-          <a:p>
-            <a:r>
-              <a:rPr lang="en-CA" b="1" dirty="0"/>
-              <a:t>Architectural Design</a:t>
-            </a:r>
-            <a:endParaRPr lang="en-US" dirty="0"/>
-          </a:p>
-          <a:p>
+            <a:endParaRPr lang="en-US" dirty="0">
+              <a:solidFill>
+                <a:srgbClr val="FF0000"/>
+              </a:solidFill>
+            </a:endParaRPr>
+          </a:p>
+          <a:p>
+            <a:pPr algn="just"/>
+            <a:r>
+              <a:rPr lang="en-CA" dirty="0" smtClean="0"/>
+              <a:t>The project is developed using the MVC </a:t>
+            </a:r>
             <a:r>
               <a:rPr lang="en-CA" dirty="0"/>
-              <a:t>The architecture of our system adopts the widely used Model-View-Controller (MVC) architecture, this model is chosen for our project since its architectural </a:t>
-            </a:r>
-            <a:r>
-              <a:rPr lang="en-US" dirty="0"/>
-              <a:t>pattern separates the representation of information from the user's interaction with it that is the source code has no reference to the Controller or the view. As a result, a clear separation of concern between the logic, data and presentation is achieved. There are many advantages of highly cohesive software architecture such as maintainable system where modifying one component doesn’t necessarily require changing the other components. In addition, MVC architecture is useful for developing in a team environment because it allows the three components to be developed simultaneously allowing for </a:t>
-            </a:r>
-            <a:r>
-              <a:rPr lang="en-CA" dirty="0"/>
-              <a:t>a very flexible and rapid development</a:t>
-            </a:r>
-            <a:r>
-              <a:rPr lang="en-US" dirty="0"/>
-              <a:t>.</a:t>
-            </a:r>
-          </a:p>
-          <a:p>
-            <a:r>
-              <a:rPr lang="en-US" dirty="0"/>
-              <a:t>A </a:t>
-            </a:r>
-            <a:r>
-              <a:rPr lang="en-US" b="1" dirty="0"/>
-              <a:t>model</a:t>
-            </a:r>
-            <a:r>
-              <a:rPr lang="en-US" dirty="0"/>
-              <a:t> notifies its associated views and controllers of state changes. This notification allows the views to produce updated interface, and the controllers to change the available set of commands. </a:t>
-            </a:r>
-          </a:p>
-          <a:p>
-            <a:r>
-              <a:rPr lang="en-US" dirty="0"/>
-              <a:t>A </a:t>
-            </a:r>
-            <a:r>
-              <a:rPr lang="en-US" b="1" dirty="0"/>
-              <a:t>view</a:t>
-            </a:r>
-            <a:r>
-              <a:rPr lang="en-US" dirty="0"/>
-              <a:t> registers the controller to receive user interface events and requests from the model the information that it needs to generate an output representation.</a:t>
-            </a:r>
-          </a:p>
-          <a:p>
-            <a:endParaRPr lang="en-US" dirty="0"/>
+              <a:t>architecture </a:t>
+            </a:r>
+            <a:r>
+              <a:rPr lang="en-CA" dirty="0" smtClean="0"/>
+              <a:t>and is implemented using the object pattern design. This model has been selected because of its decoupling advantage and its allows development of the business logic and the view separately and independently. Further, it provides flexibility in feature addition and maintenance. </a:t>
+            </a:r>
+          </a:p>
+          <a:p>
+            <a:pPr algn="just"/>
+            <a:r>
+              <a:rPr lang="en-CA" dirty="0" smtClean="0"/>
+              <a:t>The project is developed such that it has a view which extends the observable class and has a model which implements the observer class. </a:t>
+            </a:r>
+          </a:p>
+          <a:p>
+            <a:pPr algn="just"/>
+            <a:r>
+              <a:rPr lang="en-CA" dirty="0" smtClean="0"/>
+              <a:t>The view registers itself with the model so that any changes is the model which changes the state of the model gets notified to the view which is then updated accordingly. </a:t>
+            </a:r>
+          </a:p>
+          <a:p>
+            <a:pPr algn="just"/>
+            <a:r>
+              <a:rPr lang="en-CA" dirty="0" smtClean="0"/>
+              <a:t>The user interactions with the view are transferred to a separate controller class which handles all the user events and accordingly update the model objects.</a:t>
+            </a:r>
+            <a:endParaRPr lang="en-CA" dirty="0" smtClean="0"/>
           </a:p>
         </p:txBody>
       </p:sp>
@@ -4303,93 +4142,748 @@
       </p:grpSpPr>
       <p:sp>
         <p:nvSpPr>
-          <p:cNvPr id="2" name="Title 1"/>
-          <p:cNvSpPr>
-            <a:spLocks noGrp="1"/>
-          </p:cNvSpPr>
-          <p:nvPr>
-            <p:ph type="title"/>
-          </p:nvPr>
-        </p:nvSpPr>
-        <p:spPr/>
-        <p:txBody>
-          <a:bodyPr/>
-          <a:lstStyle/>
-          <a:p>
-            <a:r>
-              <a:rPr lang="en-CA" b="1" dirty="0" smtClean="0"/>
-              <a:t>Architectural Design</a:t>
-            </a:r>
+          <p:cNvPr id="3" name="Content Placeholder 2"/>
+          <p:cNvSpPr>
+            <a:spLocks noGrp="1"/>
+          </p:cNvSpPr>
+          <p:nvPr>
+            <p:ph idx="1"/>
+          </p:nvPr>
+        </p:nvSpPr>
+        <p:spPr>
+          <a:xfrm>
+            <a:off x="838200" y="470780"/>
+            <a:ext cx="10515600" cy="6038662"/>
+          </a:xfrm>
+        </p:spPr>
+        <p:txBody>
+          <a:bodyPr>
+            <a:normAutofit/>
+          </a:bodyPr>
+          <a:lstStyle/>
+          <a:p>
+            <a:pPr marL="0" indent="0" algn="just">
+              <a:buNone/>
+            </a:pPr>
+            <a:r>
+              <a:rPr lang="en-US" dirty="0" smtClean="0"/>
+              <a:t>The </a:t>
+            </a:r>
+            <a:r>
+              <a:rPr lang="en-US" dirty="0" smtClean="0">
+                <a:solidFill>
+                  <a:srgbClr val="FF0000"/>
+                </a:solidFill>
+              </a:rPr>
+              <a:t>view</a:t>
+            </a:r>
+            <a:r>
+              <a:rPr lang="en-US" dirty="0" smtClean="0"/>
+              <a:t> is the face of the application that interacts with the user. The view is updated by the model by triggering an event every time its state gets updated. The view invokes methods in the controller class for handling user interactions. The view reads data from the model classes using direct invocation.</a:t>
+            </a:r>
+          </a:p>
+          <a:p>
+            <a:pPr marL="0" indent="0" algn="just">
+              <a:buNone/>
+            </a:pPr>
             <a:endParaRPr lang="en-US" dirty="0"/>
           </a:p>
-        </p:txBody>
-      </p:sp>
-      <p:sp>
-        <p:nvSpPr>
-          <p:cNvPr id="3" name="Content Placeholder 2"/>
-          <p:cNvSpPr>
-            <a:spLocks noGrp="1"/>
-          </p:cNvSpPr>
-          <p:nvPr>
-            <p:ph idx="1"/>
-          </p:nvPr>
-        </p:nvSpPr>
-        <p:spPr/>
-        <p:txBody>
-          <a:bodyPr/>
-          <a:lstStyle/>
-          <a:p>
-            <a:r>
-              <a:rPr lang="en-US" dirty="0"/>
-              <a:t>A </a:t>
-            </a:r>
-            <a:r>
-              <a:rPr lang="en-US" b="1" dirty="0"/>
-              <a:t>controller</a:t>
-            </a:r>
-            <a:r>
-              <a:rPr lang="en-US" dirty="0"/>
-              <a:t> handles the user`s input and can send commands to its associated view to change the view's presentation of the model. When the change is purely cosmetic we update the view.</a:t>
-            </a:r>
-          </a:p>
-          <a:p>
-            <a:endParaRPr lang="en-US" dirty="0"/>
-          </a:p>
-        </p:txBody>
-      </p:sp>
-      <p:pic>
-        <p:nvPicPr>
-          <p:cNvPr id="7" name="Picture 6"/>
-          <p:cNvPicPr/>
+          <a:p>
+            <a:pPr marL="0" indent="0" algn="r">
+              <a:buNone/>
+            </a:pPr>
+            <a:endParaRPr lang="en-US" sz="1050" dirty="0" smtClean="0"/>
+          </a:p>
+          <a:p>
+            <a:pPr marL="0" indent="0" algn="r">
+              <a:buNone/>
+            </a:pPr>
+            <a:endParaRPr lang="en-US" sz="1050" dirty="0" smtClean="0"/>
+          </a:p>
+          <a:p>
+            <a:pPr marL="0" indent="0" algn="r">
+              <a:buNone/>
+            </a:pPr>
+            <a:endParaRPr lang="en-US" sz="1050" dirty="0"/>
+          </a:p>
+          <a:p>
+            <a:pPr marL="0" indent="0" algn="r">
+              <a:buNone/>
+            </a:pPr>
+            <a:endParaRPr lang="en-US" sz="1050" dirty="0" smtClean="0"/>
+          </a:p>
+          <a:p>
+            <a:pPr marL="0" indent="0" algn="r">
+              <a:buNone/>
+            </a:pPr>
+            <a:endParaRPr lang="en-US" sz="1050" dirty="0"/>
+          </a:p>
+          <a:p>
+            <a:pPr marL="0" indent="0" algn="r">
+              <a:buNone/>
+            </a:pPr>
+            <a:endParaRPr lang="en-US" sz="1050" dirty="0" smtClean="0"/>
+          </a:p>
+          <a:p>
+            <a:pPr marL="0" indent="0" algn="r">
+              <a:buNone/>
+            </a:pPr>
+            <a:endParaRPr lang="en-US" sz="1050" dirty="0"/>
+          </a:p>
+          <a:p>
+            <a:pPr marL="0" indent="0" algn="r">
+              <a:buNone/>
+            </a:pPr>
+            <a:endParaRPr lang="en-US" sz="1050" dirty="0" smtClean="0"/>
+          </a:p>
+          <a:p>
+            <a:pPr marL="0" indent="0" algn="r">
+              <a:buNone/>
+            </a:pPr>
+            <a:r>
+              <a:rPr lang="en-US" sz="1050" dirty="0" smtClean="0"/>
+              <a:t>      invocation		</a:t>
+            </a:r>
+          </a:p>
+          <a:p>
+            <a:pPr marL="0" indent="0" algn="r">
+              <a:buNone/>
+            </a:pPr>
+            <a:r>
+              <a:rPr lang="en-US" sz="1050" dirty="0"/>
+              <a:t>	</a:t>
+            </a:r>
+            <a:r>
+              <a:rPr lang="en-US" sz="1050" dirty="0" smtClean="0"/>
+              <a:t>      events		</a:t>
+            </a:r>
+          </a:p>
+          <a:p>
+            <a:pPr marL="0" indent="0" algn="r">
+              <a:buNone/>
+            </a:pPr>
+            <a:endParaRPr lang="en-US" sz="1050" dirty="0"/>
+          </a:p>
+          <a:p>
+            <a:pPr marL="0" indent="0" algn="r">
+              <a:buNone/>
+            </a:pPr>
+            <a:endParaRPr lang="en-US" sz="1050" dirty="0" smtClean="0"/>
+          </a:p>
+        </p:txBody>
+      </p:sp>
+      <p:sp>
+        <p:nvSpPr>
+          <p:cNvPr id="4" name="Rectangle 3"/>
+          <p:cNvSpPr/>
           <p:nvPr/>
-        </p:nvPicPr>
-        <p:blipFill>
-          <a:blip r:embed="rId2">
-            <a:extLst>
-              <a:ext uri="{28A0092B-C50C-407E-A947-70E740481C1C}">
-                <a14:useLocalDpi xmlns:a14="http://schemas.microsoft.com/office/drawing/2010/main" val="0"/>
-              </a:ext>
-            </a:extLst>
-          </a:blip>
-          <a:srcRect/>
-          <a:stretch>
-            <a:fillRect/>
-          </a:stretch>
-        </p:blipFill>
-        <p:spPr bwMode="auto">
+        </p:nvSpPr>
+        <p:spPr>
           <a:xfrm>
-            <a:off x="3946635" y="3666360"/>
-            <a:ext cx="3502025" cy="2078355"/>
+            <a:off x="3195870" y="3802446"/>
+            <a:ext cx="1557195" cy="715223"/>
           </a:xfrm>
           <a:prstGeom prst="rect">
             <a:avLst/>
           </a:prstGeom>
           <a:noFill/>
+        </p:spPr>
+        <p:style>
+          <a:lnRef idx="2">
+            <a:schemeClr val="accent1">
+              <a:shade val="50000"/>
+            </a:schemeClr>
+          </a:lnRef>
+          <a:fillRef idx="1">
+            <a:schemeClr val="accent1"/>
+          </a:fillRef>
+          <a:effectRef idx="0">
+            <a:schemeClr val="accent1"/>
+          </a:effectRef>
+          <a:fontRef idx="minor">
+            <a:schemeClr val="lt1"/>
+          </a:fontRef>
+        </p:style>
+        <p:txBody>
+          <a:bodyPr rtlCol="0" anchor="ctr"/>
+          <a:lstStyle/>
+          <a:p>
+            <a:pPr algn="ctr"/>
+            <a:r>
+              <a:rPr lang="en-US" dirty="0" smtClean="0">
+                <a:solidFill>
+                  <a:schemeClr val="tx1"/>
+                </a:solidFill>
+              </a:rPr>
+              <a:t>Controller</a:t>
+            </a:r>
+            <a:endParaRPr lang="en-US" dirty="0">
+              <a:solidFill>
+                <a:schemeClr val="tx1"/>
+              </a:solidFill>
+            </a:endParaRPr>
+          </a:p>
+        </p:txBody>
+      </p:sp>
+      <p:sp>
+        <p:nvSpPr>
+          <p:cNvPr id="8" name="Rectangle 7"/>
+          <p:cNvSpPr/>
+          <p:nvPr/>
+        </p:nvSpPr>
+        <p:spPr>
+          <a:xfrm>
+            <a:off x="6788587" y="3802445"/>
+            <a:ext cx="1866522" cy="715223"/>
+          </a:xfrm>
+          <a:prstGeom prst="rect">
+            <a:avLst/>
+          </a:prstGeom>
+          <a:noFill/>
+        </p:spPr>
+        <p:style>
+          <a:lnRef idx="2">
+            <a:schemeClr val="accent1">
+              <a:shade val="50000"/>
+            </a:schemeClr>
+          </a:lnRef>
+          <a:fillRef idx="1">
+            <a:schemeClr val="accent1"/>
+          </a:fillRef>
+          <a:effectRef idx="0">
+            <a:schemeClr val="accent1"/>
+          </a:effectRef>
+          <a:fontRef idx="minor">
+            <a:schemeClr val="lt1"/>
+          </a:fontRef>
+        </p:style>
+        <p:txBody>
+          <a:bodyPr rtlCol="0" anchor="ctr"/>
+          <a:lstStyle/>
+          <a:p>
+            <a:pPr algn="ctr"/>
+            <a:r>
+              <a:rPr lang="en-US" dirty="0" smtClean="0">
+                <a:solidFill>
+                  <a:schemeClr val="tx1"/>
+                </a:solidFill>
+              </a:rPr>
+              <a:t>View implements Observer </a:t>
+            </a:r>
+            <a:endParaRPr lang="en-US" dirty="0">
+              <a:solidFill>
+                <a:schemeClr val="tx1"/>
+              </a:solidFill>
+            </a:endParaRPr>
+          </a:p>
+        </p:txBody>
+      </p:sp>
+      <p:sp>
+        <p:nvSpPr>
+          <p:cNvPr id="6" name="Oval 5"/>
+          <p:cNvSpPr/>
+          <p:nvPr/>
+        </p:nvSpPr>
+        <p:spPr>
+          <a:xfrm>
+            <a:off x="5296274" y="2507801"/>
+            <a:ext cx="1077362" cy="588476"/>
+          </a:xfrm>
+          <a:prstGeom prst="ellipse">
+            <a:avLst/>
+          </a:prstGeom>
+          <a:noFill/>
+        </p:spPr>
+        <p:style>
+          <a:lnRef idx="2">
+            <a:schemeClr val="accent1">
+              <a:shade val="50000"/>
+            </a:schemeClr>
+          </a:lnRef>
+          <a:fillRef idx="1">
+            <a:schemeClr val="accent1"/>
+          </a:fillRef>
+          <a:effectRef idx="0">
+            <a:schemeClr val="accent1"/>
+          </a:effectRef>
+          <a:fontRef idx="minor">
+            <a:schemeClr val="lt1"/>
+          </a:fontRef>
+        </p:style>
+        <p:txBody>
+          <a:bodyPr rtlCol="0" anchor="ctr"/>
+          <a:lstStyle/>
+          <a:p>
+            <a:pPr algn="ctr"/>
+            <a:r>
+              <a:rPr lang="en-US" dirty="0" smtClean="0">
+                <a:solidFill>
+                  <a:schemeClr val="tx1"/>
+                </a:solidFill>
+              </a:rPr>
+              <a:t>User</a:t>
+            </a:r>
+            <a:endParaRPr lang="en-US" dirty="0">
+              <a:solidFill>
+                <a:schemeClr val="tx1"/>
+              </a:solidFill>
+            </a:endParaRPr>
+          </a:p>
+        </p:txBody>
+      </p:sp>
+      <p:sp>
+        <p:nvSpPr>
+          <p:cNvPr id="9" name="Rectangle 8"/>
+          <p:cNvSpPr/>
+          <p:nvPr/>
+        </p:nvSpPr>
+        <p:spPr>
+          <a:xfrm>
+            <a:off x="5002036" y="5213278"/>
+            <a:ext cx="1665837" cy="715223"/>
+          </a:xfrm>
+          <a:prstGeom prst="rect">
+            <a:avLst/>
+          </a:prstGeom>
+          <a:noFill/>
+        </p:spPr>
+        <p:style>
+          <a:lnRef idx="2">
+            <a:schemeClr val="accent1">
+              <a:shade val="50000"/>
+            </a:schemeClr>
+          </a:lnRef>
+          <a:fillRef idx="1">
+            <a:schemeClr val="accent1"/>
+          </a:fillRef>
+          <a:effectRef idx="0">
+            <a:schemeClr val="accent1"/>
+          </a:effectRef>
+          <a:fontRef idx="minor">
+            <a:schemeClr val="lt1"/>
+          </a:fontRef>
+        </p:style>
+        <p:txBody>
+          <a:bodyPr rtlCol="0" anchor="ctr"/>
+          <a:lstStyle/>
+          <a:p>
+            <a:pPr algn="ctr"/>
+            <a:r>
+              <a:rPr lang="en-US" dirty="0" smtClean="0">
+                <a:solidFill>
+                  <a:schemeClr val="tx1"/>
+                </a:solidFill>
+              </a:rPr>
+              <a:t>Model extends</a:t>
+            </a:r>
+          </a:p>
+          <a:p>
+            <a:pPr algn="ctr"/>
+            <a:r>
+              <a:rPr lang="en-US" dirty="0" smtClean="0">
+                <a:solidFill>
+                  <a:schemeClr val="tx1"/>
+                </a:solidFill>
+              </a:rPr>
+              <a:t>Observable </a:t>
+            </a:r>
+            <a:endParaRPr lang="en-US" dirty="0">
+              <a:solidFill>
+                <a:schemeClr val="tx1"/>
+              </a:solidFill>
+            </a:endParaRPr>
+          </a:p>
+        </p:txBody>
+      </p:sp>
+      <p:cxnSp>
+        <p:nvCxnSpPr>
+          <p:cNvPr id="13" name="Straight Connector 12"/>
+          <p:cNvCxnSpPr/>
+          <p:nvPr/>
+        </p:nvCxnSpPr>
+        <p:spPr>
+          <a:xfrm>
+            <a:off x="7839537" y="4505597"/>
+            <a:ext cx="25653" cy="1179970"/>
+          </a:xfrm>
+          <a:prstGeom prst="line">
+            <a:avLst/>
+          </a:prstGeom>
+        </p:spPr>
+        <p:style>
+          <a:lnRef idx="1">
+            <a:schemeClr val="accent1"/>
+          </a:lnRef>
+          <a:fillRef idx="0">
+            <a:schemeClr val="accent1"/>
+          </a:fillRef>
+          <a:effectRef idx="0">
+            <a:schemeClr val="accent1"/>
+          </a:effectRef>
+          <a:fontRef idx="minor">
+            <a:schemeClr val="tx1"/>
+          </a:fontRef>
+        </p:style>
+      </p:cxnSp>
+      <p:cxnSp>
+        <p:nvCxnSpPr>
+          <p:cNvPr id="15" name="Straight Arrow Connector 14"/>
+          <p:cNvCxnSpPr/>
+          <p:nvPr/>
+        </p:nvCxnSpPr>
+        <p:spPr>
+          <a:xfrm flipH="1">
+            <a:off x="6667874" y="5699146"/>
+            <a:ext cx="1197316" cy="1"/>
+          </a:xfrm>
+          <a:prstGeom prst="straightConnector1">
+            <a:avLst/>
+          </a:prstGeom>
           <a:ln>
-            <a:noFill/>
+            <a:tailEnd type="triangle"/>
           </a:ln>
         </p:spPr>
-      </p:pic>
+        <p:style>
+          <a:lnRef idx="1">
+            <a:schemeClr val="accent1"/>
+          </a:lnRef>
+          <a:fillRef idx="0">
+            <a:schemeClr val="accent1"/>
+          </a:fillRef>
+          <a:effectRef idx="0">
+            <a:schemeClr val="accent1"/>
+          </a:effectRef>
+          <a:fontRef idx="minor">
+            <a:schemeClr val="tx1"/>
+          </a:fontRef>
+        </p:style>
+      </p:cxnSp>
+      <p:cxnSp>
+        <p:nvCxnSpPr>
+          <p:cNvPr id="23" name="Straight Arrow Connector 22"/>
+          <p:cNvCxnSpPr/>
+          <p:nvPr/>
+        </p:nvCxnSpPr>
+        <p:spPr>
+          <a:xfrm flipH="1">
+            <a:off x="4753065" y="4051421"/>
+            <a:ext cx="2035522" cy="1"/>
+          </a:xfrm>
+          <a:prstGeom prst="straightConnector1">
+            <a:avLst/>
+          </a:prstGeom>
+          <a:ln>
+            <a:tailEnd type="triangle"/>
+          </a:ln>
+        </p:spPr>
+        <p:style>
+          <a:lnRef idx="1">
+            <a:schemeClr val="accent1"/>
+          </a:lnRef>
+          <a:fillRef idx="0">
+            <a:schemeClr val="accent1"/>
+          </a:fillRef>
+          <a:effectRef idx="0">
+            <a:schemeClr val="accent1"/>
+          </a:effectRef>
+          <a:fontRef idx="minor">
+            <a:schemeClr val="tx1"/>
+          </a:fontRef>
+        </p:style>
+      </p:cxnSp>
+      <p:cxnSp>
+        <p:nvCxnSpPr>
+          <p:cNvPr id="31" name="Straight Connector 30"/>
+          <p:cNvCxnSpPr/>
+          <p:nvPr/>
+        </p:nvCxnSpPr>
+        <p:spPr>
+          <a:xfrm flipH="1" flipV="1">
+            <a:off x="6667875" y="5423013"/>
+            <a:ext cx="927982" cy="6597"/>
+          </a:xfrm>
+          <a:prstGeom prst="line">
+            <a:avLst/>
+          </a:prstGeom>
+        </p:spPr>
+        <p:style>
+          <a:lnRef idx="1">
+            <a:schemeClr val="dk1"/>
+          </a:lnRef>
+          <a:fillRef idx="0">
+            <a:schemeClr val="dk1"/>
+          </a:fillRef>
+          <a:effectRef idx="0">
+            <a:schemeClr val="dk1"/>
+          </a:effectRef>
+          <a:fontRef idx="minor">
+            <a:schemeClr val="tx1"/>
+          </a:fontRef>
+        </p:style>
+      </p:cxnSp>
+      <p:cxnSp>
+        <p:nvCxnSpPr>
+          <p:cNvPr id="36" name="Straight Arrow Connector 35"/>
+          <p:cNvCxnSpPr/>
+          <p:nvPr/>
+        </p:nvCxnSpPr>
+        <p:spPr>
+          <a:xfrm flipH="1" flipV="1">
+            <a:off x="7586804" y="4517668"/>
+            <a:ext cx="9053" cy="912352"/>
+          </a:xfrm>
+          <a:prstGeom prst="straightConnector1">
+            <a:avLst/>
+          </a:prstGeom>
+          <a:ln>
+            <a:tailEnd type="triangle"/>
+          </a:ln>
+        </p:spPr>
+        <p:style>
+          <a:lnRef idx="1">
+            <a:schemeClr val="dk1"/>
+          </a:lnRef>
+          <a:fillRef idx="0">
+            <a:schemeClr val="dk1"/>
+          </a:fillRef>
+          <a:effectRef idx="0">
+            <a:schemeClr val="dk1"/>
+          </a:effectRef>
+          <a:fontRef idx="minor">
+            <a:schemeClr val="tx1"/>
+          </a:fontRef>
+        </p:style>
+      </p:cxnSp>
+      <p:cxnSp>
+        <p:nvCxnSpPr>
+          <p:cNvPr id="42" name="Straight Connector 41"/>
+          <p:cNvCxnSpPr>
+            <a:stCxn id="4" idx="2"/>
+          </p:cNvCxnSpPr>
+          <p:nvPr/>
+        </p:nvCxnSpPr>
+        <p:spPr>
+          <a:xfrm flipH="1">
+            <a:off x="3974467" y="4517669"/>
+            <a:ext cx="1" cy="1053220"/>
+          </a:xfrm>
+          <a:prstGeom prst="line">
+            <a:avLst/>
+          </a:prstGeom>
+        </p:spPr>
+        <p:style>
+          <a:lnRef idx="1">
+            <a:schemeClr val="accent1"/>
+          </a:lnRef>
+          <a:fillRef idx="0">
+            <a:schemeClr val="accent1"/>
+          </a:fillRef>
+          <a:effectRef idx="0">
+            <a:schemeClr val="accent1"/>
+          </a:effectRef>
+          <a:fontRef idx="minor">
+            <a:schemeClr val="tx1"/>
+          </a:fontRef>
+        </p:style>
+      </p:cxnSp>
+      <p:cxnSp>
+        <p:nvCxnSpPr>
+          <p:cNvPr id="44" name="Straight Arrow Connector 43"/>
+          <p:cNvCxnSpPr>
+            <a:endCxn id="9" idx="1"/>
+          </p:cNvCxnSpPr>
+          <p:nvPr/>
+        </p:nvCxnSpPr>
+        <p:spPr>
+          <a:xfrm>
+            <a:off x="3969184" y="5570889"/>
+            <a:ext cx="1032852" cy="1"/>
+          </a:xfrm>
+          <a:prstGeom prst="straightConnector1">
+            <a:avLst/>
+          </a:prstGeom>
+          <a:ln>
+            <a:tailEnd type="triangle"/>
+          </a:ln>
+        </p:spPr>
+        <p:style>
+          <a:lnRef idx="1">
+            <a:schemeClr val="accent1"/>
+          </a:lnRef>
+          <a:fillRef idx="0">
+            <a:schemeClr val="accent1"/>
+          </a:fillRef>
+          <a:effectRef idx="0">
+            <a:schemeClr val="accent1"/>
+          </a:effectRef>
+          <a:fontRef idx="minor">
+            <a:schemeClr val="tx1"/>
+          </a:fontRef>
+        </p:style>
+      </p:cxnSp>
+      <p:cxnSp>
+        <p:nvCxnSpPr>
+          <p:cNvPr id="46" name="Straight Arrow Connector 45"/>
+          <p:cNvCxnSpPr>
+            <a:stCxn id="6" idx="6"/>
+          </p:cNvCxnSpPr>
+          <p:nvPr/>
+        </p:nvCxnSpPr>
+        <p:spPr>
+          <a:xfrm>
+            <a:off x="6373636" y="2802039"/>
+            <a:ext cx="1575307" cy="1000406"/>
+          </a:xfrm>
+          <a:prstGeom prst="straightConnector1">
+            <a:avLst/>
+          </a:prstGeom>
+          <a:ln>
+            <a:tailEnd type="triangle"/>
+          </a:ln>
+        </p:spPr>
+        <p:style>
+          <a:lnRef idx="1">
+            <a:schemeClr val="dk1"/>
+          </a:lnRef>
+          <a:fillRef idx="0">
+            <a:schemeClr val="dk1"/>
+          </a:fillRef>
+          <a:effectRef idx="0">
+            <a:schemeClr val="dk1"/>
+          </a:effectRef>
+          <a:fontRef idx="minor">
+            <a:schemeClr val="tx1"/>
+          </a:fontRef>
+        </p:style>
+      </p:cxnSp>
+      <p:cxnSp>
+        <p:nvCxnSpPr>
+          <p:cNvPr id="48" name="Straight Arrow Connector 47"/>
+          <p:cNvCxnSpPr>
+            <a:endCxn id="6" idx="5"/>
+          </p:cNvCxnSpPr>
+          <p:nvPr/>
+        </p:nvCxnSpPr>
+        <p:spPr>
+          <a:xfrm flipH="1" flipV="1">
+            <a:off x="6215860" y="3010097"/>
+            <a:ext cx="1280409" cy="792348"/>
+          </a:xfrm>
+          <a:prstGeom prst="straightConnector1">
+            <a:avLst/>
+          </a:prstGeom>
+          <a:ln>
+            <a:tailEnd type="triangle"/>
+          </a:ln>
+        </p:spPr>
+        <p:style>
+          <a:lnRef idx="1">
+            <a:schemeClr val="accent1"/>
+          </a:lnRef>
+          <a:fillRef idx="0">
+            <a:schemeClr val="accent1"/>
+          </a:fillRef>
+          <a:effectRef idx="0">
+            <a:schemeClr val="accent1"/>
+          </a:effectRef>
+          <a:fontRef idx="minor">
+            <a:schemeClr val="tx1"/>
+          </a:fontRef>
+        </p:style>
+      </p:cxnSp>
+      <p:cxnSp>
+        <p:nvCxnSpPr>
+          <p:cNvPr id="50" name="Straight Arrow Connector 49"/>
+          <p:cNvCxnSpPr/>
+          <p:nvPr/>
+        </p:nvCxnSpPr>
+        <p:spPr>
+          <a:xfrm>
+            <a:off x="4753065" y="4304741"/>
+            <a:ext cx="2035522" cy="0"/>
+          </a:xfrm>
+          <a:prstGeom prst="straightConnector1">
+            <a:avLst/>
+          </a:prstGeom>
+          <a:ln>
+            <a:tailEnd type="triangle"/>
+          </a:ln>
+        </p:spPr>
+        <p:style>
+          <a:lnRef idx="1">
+            <a:schemeClr val="accent1"/>
+          </a:lnRef>
+          <a:fillRef idx="0">
+            <a:schemeClr val="accent1"/>
+          </a:fillRef>
+          <a:effectRef idx="0">
+            <a:schemeClr val="accent1"/>
+          </a:effectRef>
+          <a:fontRef idx="minor">
+            <a:schemeClr val="tx1"/>
+          </a:fontRef>
+        </p:style>
+      </p:cxnSp>
+      <p:cxnSp>
+        <p:nvCxnSpPr>
+          <p:cNvPr id="52" name="Straight Connector 51"/>
+          <p:cNvCxnSpPr/>
+          <p:nvPr/>
+        </p:nvCxnSpPr>
+        <p:spPr>
+          <a:xfrm>
+            <a:off x="9171160" y="5299298"/>
+            <a:ext cx="380246" cy="0"/>
+          </a:xfrm>
+          <a:prstGeom prst="line">
+            <a:avLst/>
+          </a:prstGeom>
+        </p:spPr>
+        <p:style>
+          <a:lnRef idx="1">
+            <a:schemeClr val="accent1"/>
+          </a:lnRef>
+          <a:fillRef idx="0">
+            <a:schemeClr val="accent1"/>
+          </a:fillRef>
+          <a:effectRef idx="0">
+            <a:schemeClr val="accent1"/>
+          </a:effectRef>
+          <a:fontRef idx="minor">
+            <a:schemeClr val="tx1"/>
+          </a:fontRef>
+        </p:style>
+      </p:cxnSp>
+      <p:cxnSp>
+        <p:nvCxnSpPr>
+          <p:cNvPr id="54" name="Straight Connector 53"/>
+          <p:cNvCxnSpPr/>
+          <p:nvPr/>
+        </p:nvCxnSpPr>
+        <p:spPr>
+          <a:xfrm>
+            <a:off x="9180214" y="5576937"/>
+            <a:ext cx="371192" cy="0"/>
+          </a:xfrm>
+          <a:prstGeom prst="line">
+            <a:avLst/>
+          </a:prstGeom>
+        </p:spPr>
+        <p:style>
+          <a:lnRef idx="1">
+            <a:schemeClr val="dk1"/>
+          </a:lnRef>
+          <a:fillRef idx="0">
+            <a:schemeClr val="dk1"/>
+          </a:fillRef>
+          <a:effectRef idx="0">
+            <a:schemeClr val="dk1"/>
+          </a:effectRef>
+          <a:fontRef idx="minor">
+            <a:schemeClr val="tx1"/>
+          </a:fontRef>
+        </p:style>
+      </p:cxnSp>
     </p:spTree>
     <p:extLst>
       <p:ext uri="{BB962C8B-B14F-4D97-AF65-F5344CB8AC3E}">
@@ -4411,6 +4905,120 @@
 </file>
 
 <file path=ppt/slides/slide6.xml><?xml version="1.0" encoding="utf-8"?>
+<p:sld xmlns:a="http://schemas.openxmlformats.org/drawingml/2006/main" xmlns:r="http://schemas.openxmlformats.org/officeDocument/2006/relationships" xmlns:p="http://schemas.openxmlformats.org/presentationml/2006/main">
+  <p:cSld>
+    <p:spTree>
+      <p:nvGrpSpPr>
+        <p:cNvPr id="1" name=""/>
+        <p:cNvGrpSpPr/>
+        <p:nvPr/>
+      </p:nvGrpSpPr>
+      <p:grpSpPr>
+        <a:xfrm>
+          <a:off x="0" y="0"/>
+          <a:ext cx="0" cy="0"/>
+          <a:chOff x="0" y="0"/>
+          <a:chExt cx="0" cy="0"/>
+        </a:xfrm>
+      </p:grpSpPr>
+      <p:sp>
+        <p:nvSpPr>
+          <p:cNvPr id="3" name="Content Placeholder 2"/>
+          <p:cNvSpPr>
+            <a:spLocks noGrp="1"/>
+          </p:cNvSpPr>
+          <p:nvPr>
+            <p:ph idx="1"/>
+          </p:nvPr>
+        </p:nvSpPr>
+        <p:spPr>
+          <a:xfrm>
+            <a:off x="838200" y="497941"/>
+            <a:ext cx="10515600" cy="5679022"/>
+          </a:xfrm>
+        </p:spPr>
+        <p:txBody>
+          <a:bodyPr/>
+          <a:lstStyle/>
+          <a:p>
+            <a:pPr marL="0" indent="0" algn="just">
+              <a:buNone/>
+            </a:pPr>
+            <a:r>
+              <a:rPr lang="en-US" dirty="0"/>
+              <a:t>The </a:t>
+            </a:r>
+            <a:r>
+              <a:rPr lang="en-US" dirty="0">
+                <a:solidFill>
+                  <a:srgbClr val="FF0000"/>
+                </a:solidFill>
+              </a:rPr>
+              <a:t>controller</a:t>
+            </a:r>
+            <a:r>
+              <a:rPr lang="en-US" dirty="0"/>
+              <a:t> is invoked by the event handlers in the view which handles the user`s </a:t>
+            </a:r>
+            <a:r>
+              <a:rPr lang="en-US" dirty="0" smtClean="0"/>
+              <a:t>input. It is responsible for the implementing the application behavior towards user interactions. It updates the model classes based on the user interactions.</a:t>
+            </a:r>
+          </a:p>
+          <a:p>
+            <a:pPr marL="0" indent="0" algn="just">
+              <a:buNone/>
+            </a:pPr>
+            <a:endParaRPr lang="en-US" dirty="0" smtClean="0"/>
+          </a:p>
+          <a:p>
+            <a:pPr marL="0" indent="0" algn="just">
+              <a:buNone/>
+            </a:pPr>
+            <a:r>
+              <a:rPr lang="en-US" dirty="0" smtClean="0"/>
+              <a:t>The </a:t>
+            </a:r>
+            <a:r>
+              <a:rPr lang="en-US" dirty="0" smtClean="0">
+                <a:solidFill>
+                  <a:srgbClr val="FF0000"/>
+                </a:solidFill>
+              </a:rPr>
+              <a:t>model</a:t>
+            </a:r>
+            <a:r>
+              <a:rPr lang="en-US" dirty="0" smtClean="0"/>
+              <a:t> classes implement the business logic and handles the data associated with the application. It is an extension of the observable class. The view or the controller classes updates the model depending on the user interaction with the user provided input. If it is a valid change and the state of the model is updated, the model sets its state and update all observers of the model. Thus, the registered view gets the update trigger event and the view is </a:t>
+            </a:r>
+            <a:r>
+              <a:rPr lang="en-US" smtClean="0"/>
+              <a:t>updated accordingly. </a:t>
+            </a:r>
+            <a:endParaRPr lang="en-US" dirty="0"/>
+          </a:p>
+          <a:p>
+            <a:pPr marL="0" indent="0" algn="just">
+              <a:buNone/>
+            </a:pPr>
+            <a:endParaRPr lang="en-US" dirty="0"/>
+          </a:p>
+        </p:txBody>
+      </p:sp>
+    </p:spTree>
+    <p:extLst>
+      <p:ext uri="{BB962C8B-B14F-4D97-AF65-F5344CB8AC3E}">
+        <p14:creationId xmlns:p14="http://schemas.microsoft.com/office/powerpoint/2010/main" val="964007905"/>
+      </p:ext>
+    </p:extLst>
+  </p:cSld>
+  <p:clrMapOvr>
+    <a:masterClrMapping/>
+  </p:clrMapOvr>
+</p:sld>
+</file>
+
+<file path=ppt/slides/slide7.xml><?xml version="1.0" encoding="utf-8"?>
 <p:sld xmlns:a="http://schemas.openxmlformats.org/drawingml/2006/main" xmlns:r="http://schemas.openxmlformats.org/officeDocument/2006/relationships" xmlns:p="http://schemas.openxmlformats.org/presentationml/2006/main">
   <p:cSld>
     <p:spTree>
@@ -4591,7 +5199,7 @@
 </p:sld>
 </file>
 
-<file path=ppt/slides/slide7.xml><?xml version="1.0" encoding="utf-8"?>
+<file path=ppt/slides/slide8.xml><?xml version="1.0" encoding="utf-8"?>
 <p:sld xmlns:a="http://schemas.openxmlformats.org/drawingml/2006/main" xmlns:r="http://schemas.openxmlformats.org/officeDocument/2006/relationships" xmlns:p="http://schemas.openxmlformats.org/presentationml/2006/main">
   <p:cSld>
     <p:spTree>
@@ -4710,7 +5318,7 @@
 </p:sld>
 </file>
 
-<file path=ppt/slides/slide8.xml><?xml version="1.0" encoding="utf-8"?>
+<file path=ppt/slides/slide9.xml><?xml version="1.0" encoding="utf-8"?>
 <p:sld xmlns:a="http://schemas.openxmlformats.org/drawingml/2006/main" xmlns:r="http://schemas.openxmlformats.org/officeDocument/2006/relationships" xmlns:p="http://schemas.openxmlformats.org/presentationml/2006/main">
   <p:cSld>
     <p:spTree>
@@ -4791,103 +5399,6 @@
     <p:extLst>
       <p:ext uri="{BB962C8B-B14F-4D97-AF65-F5344CB8AC3E}">
         <p14:creationId xmlns:p14="http://schemas.microsoft.com/office/powerpoint/2010/main" val="145071701"/>
-      </p:ext>
-    </p:extLst>
-  </p:cSld>
-  <p:clrMapOvr>
-    <a:masterClrMapping/>
-  </p:clrMapOvr>
-  <p:timing>
-    <p:tnLst>
-      <p:par>
-        <p:cTn id="1" dur="indefinite" restart="never" nodeType="tmRoot"/>
-      </p:par>
-    </p:tnLst>
-  </p:timing>
-</p:sld>
-</file>
-
-<file path=ppt/slides/slide9.xml><?xml version="1.0" encoding="utf-8"?>
-<p:sld xmlns:a="http://schemas.openxmlformats.org/drawingml/2006/main" xmlns:r="http://schemas.openxmlformats.org/officeDocument/2006/relationships" xmlns:p="http://schemas.openxmlformats.org/presentationml/2006/main">
-  <p:cSld>
-    <p:spTree>
-      <p:nvGrpSpPr>
-        <p:cNvPr id="1" name=""/>
-        <p:cNvGrpSpPr/>
-        <p:nvPr/>
-      </p:nvGrpSpPr>
-      <p:grpSpPr>
-        <a:xfrm>
-          <a:off x="0" y="0"/>
-          <a:ext cx="0" cy="0"/>
-          <a:chOff x="0" y="0"/>
-          <a:chExt cx="0" cy="0"/>
-        </a:xfrm>
-      </p:grpSpPr>
-      <p:sp>
-        <p:nvSpPr>
-          <p:cNvPr id="2" name="Title 1"/>
-          <p:cNvSpPr>
-            <a:spLocks noGrp="1"/>
-          </p:cNvSpPr>
-          <p:nvPr>
-            <p:ph type="title"/>
-          </p:nvPr>
-        </p:nvSpPr>
-        <p:spPr/>
-        <p:txBody>
-          <a:bodyPr/>
-          <a:lstStyle/>
-          <a:p>
-            <a:r>
-              <a:rPr lang="en-CA" dirty="0" smtClean="0"/>
-              <a:t>UML Class diagram for MVC Architecture</a:t>
-            </a:r>
-            <a:endParaRPr lang="en-US" dirty="0"/>
-          </a:p>
-        </p:txBody>
-      </p:sp>
-      <p:pic>
-        <p:nvPicPr>
-          <p:cNvPr id="4" name="Content Placeholder 3" descr="Tower_UML"/>
-          <p:cNvPicPr>
-            <a:picLocks noGrp="1"/>
-          </p:cNvPicPr>
-          <p:nvPr>
-            <p:ph idx="1"/>
-          </p:nvPr>
-        </p:nvPicPr>
-        <p:blipFill>
-          <a:blip r:embed="rId2">
-            <a:extLst>
-              <a:ext uri="{28A0092B-C50C-407E-A947-70E740481C1C}">
-                <a14:useLocalDpi xmlns:a14="http://schemas.microsoft.com/office/drawing/2010/main" val="0"/>
-              </a:ext>
-            </a:extLst>
-          </a:blip>
-          <a:srcRect/>
-          <a:stretch>
-            <a:fillRect/>
-          </a:stretch>
-        </p:blipFill>
-        <p:spPr bwMode="auto">
-          <a:xfrm>
-            <a:off x="3280428" y="2160603"/>
-            <a:ext cx="5631143" cy="4351338"/>
-          </a:xfrm>
-          <a:prstGeom prst="rect">
-            <a:avLst/>
-          </a:prstGeom>
-          <a:noFill/>
-          <a:ln>
-            <a:noFill/>
-          </a:ln>
-        </p:spPr>
-      </p:pic>
-    </p:spTree>
-    <p:extLst>
-      <p:ext uri="{BB962C8B-B14F-4D97-AF65-F5344CB8AC3E}">
-        <p14:creationId xmlns:p14="http://schemas.microsoft.com/office/powerpoint/2010/main" val="3077153077"/>
       </p:ext>
     </p:extLst>
   </p:cSld>

</xml_diff>